<commit_message>
#828 SBE docs: improve various descriptions related to verification.
</commit_message>
<xml_diff>
--- a/cif/org.eclipse.escet.cif.documentation/images/synthesis-based-engineering/approaches/process_synthesis_based.pptx
+++ b/cif/org.eclipse.escet.cif.documentation/images/synthesis-based-engineering/approaches/process_synthesis_based.pptx
@@ -493,7 +493,7 @@
           <a:p>
             <a:fld id="{D965D5E7-AD3D-4631-AD8E-298F87323C43}" type="datetimeFigureOut">
               <a:rPr lang="nl-NL" smtClean="0"/>
-              <a:t>13-3-2022</a:t>
+              <a:t>za 11-5-2024</a:t>
             </a:fld>
             <a:endParaRPr lang="nl-NL"/>
           </a:p>
@@ -693,7 +693,7 @@
           <a:p>
             <a:fld id="{D965D5E7-AD3D-4631-AD8E-298F87323C43}" type="datetimeFigureOut">
               <a:rPr lang="nl-NL" smtClean="0"/>
-              <a:t>13-3-2022</a:t>
+              <a:t>za 11-5-2024</a:t>
             </a:fld>
             <a:endParaRPr lang="nl-NL"/>
           </a:p>
@@ -903,7 +903,7 @@
           <a:p>
             <a:fld id="{D965D5E7-AD3D-4631-AD8E-298F87323C43}" type="datetimeFigureOut">
               <a:rPr lang="nl-NL" smtClean="0"/>
-              <a:t>13-3-2022</a:t>
+              <a:t>za 11-5-2024</a:t>
             </a:fld>
             <a:endParaRPr lang="nl-NL"/>
           </a:p>
@@ -1103,7 +1103,7 @@
           <a:p>
             <a:fld id="{D965D5E7-AD3D-4631-AD8E-298F87323C43}" type="datetimeFigureOut">
               <a:rPr lang="nl-NL" smtClean="0"/>
-              <a:t>13-3-2022</a:t>
+              <a:t>za 11-5-2024</a:t>
             </a:fld>
             <a:endParaRPr lang="nl-NL"/>
           </a:p>
@@ -1379,7 +1379,7 @@
           <a:p>
             <a:fld id="{D965D5E7-AD3D-4631-AD8E-298F87323C43}" type="datetimeFigureOut">
               <a:rPr lang="nl-NL" smtClean="0"/>
-              <a:t>13-3-2022</a:t>
+              <a:t>za 11-5-2024</a:t>
             </a:fld>
             <a:endParaRPr lang="nl-NL"/>
           </a:p>
@@ -1647,7 +1647,7 @@
           <a:p>
             <a:fld id="{D965D5E7-AD3D-4631-AD8E-298F87323C43}" type="datetimeFigureOut">
               <a:rPr lang="nl-NL" smtClean="0"/>
-              <a:t>13-3-2022</a:t>
+              <a:t>za 11-5-2024</a:t>
             </a:fld>
             <a:endParaRPr lang="nl-NL"/>
           </a:p>
@@ -2062,7 +2062,7 @@
           <a:p>
             <a:fld id="{D965D5E7-AD3D-4631-AD8E-298F87323C43}" type="datetimeFigureOut">
               <a:rPr lang="nl-NL" smtClean="0"/>
-              <a:t>13-3-2022</a:t>
+              <a:t>za 11-5-2024</a:t>
             </a:fld>
             <a:endParaRPr lang="nl-NL"/>
           </a:p>
@@ -2204,7 +2204,7 @@
           <a:p>
             <a:fld id="{D965D5E7-AD3D-4631-AD8E-298F87323C43}" type="datetimeFigureOut">
               <a:rPr lang="nl-NL" smtClean="0"/>
-              <a:t>13-3-2022</a:t>
+              <a:t>za 11-5-2024</a:t>
             </a:fld>
             <a:endParaRPr lang="nl-NL"/>
           </a:p>
@@ -2317,7 +2317,7 @@
           <a:p>
             <a:fld id="{D965D5E7-AD3D-4631-AD8E-298F87323C43}" type="datetimeFigureOut">
               <a:rPr lang="nl-NL" smtClean="0"/>
-              <a:t>13-3-2022</a:t>
+              <a:t>za 11-5-2024</a:t>
             </a:fld>
             <a:endParaRPr lang="nl-NL"/>
           </a:p>
@@ -2630,7 +2630,7 @@
           <a:p>
             <a:fld id="{D965D5E7-AD3D-4631-AD8E-298F87323C43}" type="datetimeFigureOut">
               <a:rPr lang="nl-NL" smtClean="0"/>
-              <a:t>13-3-2022</a:t>
+              <a:t>za 11-5-2024</a:t>
             </a:fld>
             <a:endParaRPr lang="nl-NL"/>
           </a:p>
@@ -2919,7 +2919,7 @@
           <a:p>
             <a:fld id="{D965D5E7-AD3D-4631-AD8E-298F87323C43}" type="datetimeFigureOut">
               <a:rPr lang="nl-NL" smtClean="0"/>
-              <a:t>13-3-2022</a:t>
+              <a:t>za 11-5-2024</a:t>
             </a:fld>
             <a:endParaRPr lang="nl-NL"/>
           </a:p>
@@ -3162,7 +3162,7 @@
           <a:p>
             <a:fld id="{D965D5E7-AD3D-4631-AD8E-298F87323C43}" type="datetimeFigureOut">
               <a:rPr lang="nl-NL" smtClean="0"/>
-              <a:t>13-3-2022</a:t>
+              <a:t>za 11-5-2024</a:t>
             </a:fld>
             <a:endParaRPr lang="nl-NL"/>
           </a:p>
@@ -4321,8 +4321,8 @@
         </p:nvSpPr>
         <p:spPr>
           <a:xfrm>
-            <a:off x="5787633" y="1544694"/>
-            <a:ext cx="1229183" cy="400110"/>
+            <a:off x="5461922" y="1488034"/>
+            <a:ext cx="1659685" cy="707886"/>
           </a:xfrm>
           <a:prstGeom prst="rect">
             <a:avLst/>
@@ -4338,35 +4338,45 @@
             <a:pPr algn="ctr"/>
             <a:r>
               <a:rPr lang="en-US" sz="2000" dirty="0"/>
-              <a:t>Validation</a:t>
-            </a:r>
-          </a:p>
-        </p:txBody>
-      </p:sp>
-      <p:sp>
-        <p:nvSpPr>
-          <p:cNvPr id="27" name="Arc 26">
-            <a:extLst>
-              <a:ext uri="{FF2B5EF4-FFF2-40B4-BE49-F238E27FC236}">
-                <a16:creationId xmlns:a16="http://schemas.microsoft.com/office/drawing/2014/main" id="{60C6AB47-30AE-4F52-9EDE-12D57CD36022}"/>
-              </a:ext>
-            </a:extLst>
-          </p:cNvPr>
-          <p:cNvSpPr/>
+              <a:t>Verification</a:t>
+            </a:r>
+          </a:p>
+          <a:p>
+            <a:pPr algn="ctr"/>
+            <a:r>
+              <a:rPr lang="en-US" sz="2000" dirty="0"/>
+              <a:t>and validation</a:t>
+            </a:r>
+          </a:p>
+        </p:txBody>
+      </p:sp>
+      <p:cxnSp>
+        <p:nvCxnSpPr>
+          <p:cNvPr id="3" name="Connector: Curved 2">
+            <a:extLst>
+              <a:ext uri="{FF2B5EF4-FFF2-40B4-BE49-F238E27FC236}">
+                <a16:creationId xmlns:a16="http://schemas.microsoft.com/office/drawing/2014/main" id="{DDA1ABC9-B4F2-F329-3EC9-050C5E050FB6}"/>
+              </a:ext>
+            </a:extLst>
+          </p:cNvPr>
+          <p:cNvCxnSpPr>
+            <a:stCxn id="5" idx="0"/>
+          </p:cNvCxnSpPr>
           <p:nvPr/>
-        </p:nvSpPr>
+        </p:nvCxnSpPr>
         <p:spPr>
-          <a:xfrm>
-            <a:off x="6190639" y="1976287"/>
-            <a:ext cx="423171" cy="740987"/>
+          <a:xfrm rot="16200000" flipV="1">
+            <a:off x="4207836" y="446944"/>
+            <a:ext cx="806642" cy="3585685"/>
           </a:xfrm>
-          <a:prstGeom prst="arc">
-            <a:avLst>
-              <a:gd name="adj1" fmla="val 6750521"/>
-              <a:gd name="adj2" fmla="val 4103113"/>
-            </a:avLst>
+          <a:prstGeom prst="curvedConnector2">
+            <a:avLst/>
           </a:prstGeom>
-          <a:noFill/>
+          <a:solidFill>
+            <a:schemeClr val="bg1">
+              <a:lumMod val="85000"/>
+            </a:schemeClr>
+          </a:solidFill>
           <a:ln w="38100">
             <a:solidFill>
               <a:schemeClr val="bg1">
@@ -4393,15 +4403,7 @@
             <a:schemeClr val="lt1"/>
           </a:fontRef>
         </p:style>
-        <p:txBody>
-          <a:bodyPr rtlCol="0" anchor="ctr"/>
-          <a:lstStyle/>
-          <a:p>
-            <a:pPr algn="ctr"/>
-            <a:endParaRPr lang="en-US" sz="2000"/>
-          </a:p>
-        </p:txBody>
-      </p:sp>
+      </p:cxnSp>
     </p:spTree>
     <p:extLst>
       <p:ext uri="{BB962C8B-B14F-4D97-AF65-F5344CB8AC3E}">

</xml_diff>